<commit_message>
docs: initial NRF on battery document
</commit_message>
<xml_diff>
--- a/docs/linux-deamons.pptx
+++ b/docs/linux-deamons.pptx
@@ -11,6 +11,7 @@
     <p:sldId id="258" r:id="rId5"/>
     <p:sldId id="259" r:id="rId6"/>
     <p:sldId id="261" r:id="rId7"/>
+    <p:sldId id="262" r:id="rId8"/>
   </p:sldIdLst>
   <p:sldSz cx="12192000" cy="6858000"/>
   <p:notesSz cx="6858000" cy="9144000"/>
@@ -248,7 +249,7 @@
           <a:p>
             <a:fld id="{A4AC1E80-B3D7-43F3-A8C9-A8CB4D81571C}" type="datetimeFigureOut">
               <a:rPr lang="en-US" smtClean="0"/>
-              <a:t>11/21/2014</a:t>
+              <a:t>12/24/2014</a:t>
             </a:fld>
             <a:endParaRPr lang="en-US"/>
           </a:p>
@@ -418,7 +419,7 @@
           <a:p>
             <a:fld id="{A4AC1E80-B3D7-43F3-A8C9-A8CB4D81571C}" type="datetimeFigureOut">
               <a:rPr lang="en-US" smtClean="0"/>
-              <a:t>11/21/2014</a:t>
+              <a:t>12/24/2014</a:t>
             </a:fld>
             <a:endParaRPr lang="en-US"/>
           </a:p>
@@ -598,7 +599,7 @@
           <a:p>
             <a:fld id="{A4AC1E80-B3D7-43F3-A8C9-A8CB4D81571C}" type="datetimeFigureOut">
               <a:rPr lang="en-US" smtClean="0"/>
-              <a:t>11/21/2014</a:t>
+              <a:t>12/24/2014</a:t>
             </a:fld>
             <a:endParaRPr lang="en-US"/>
           </a:p>
@@ -768,7 +769,7 @@
           <a:p>
             <a:fld id="{A4AC1E80-B3D7-43F3-A8C9-A8CB4D81571C}" type="datetimeFigureOut">
               <a:rPr lang="en-US" smtClean="0"/>
-              <a:t>11/21/2014</a:t>
+              <a:t>12/24/2014</a:t>
             </a:fld>
             <a:endParaRPr lang="en-US"/>
           </a:p>
@@ -1014,7 +1015,7 @@
           <a:p>
             <a:fld id="{A4AC1E80-B3D7-43F3-A8C9-A8CB4D81571C}" type="datetimeFigureOut">
               <a:rPr lang="en-US" smtClean="0"/>
-              <a:t>11/21/2014</a:t>
+              <a:t>12/24/2014</a:t>
             </a:fld>
             <a:endParaRPr lang="en-US"/>
           </a:p>
@@ -1246,7 +1247,7 @@
           <a:p>
             <a:fld id="{A4AC1E80-B3D7-43F3-A8C9-A8CB4D81571C}" type="datetimeFigureOut">
               <a:rPr lang="en-US" smtClean="0"/>
-              <a:t>11/21/2014</a:t>
+              <a:t>12/24/2014</a:t>
             </a:fld>
             <a:endParaRPr lang="en-US"/>
           </a:p>
@@ -1613,7 +1614,7 @@
           <a:p>
             <a:fld id="{A4AC1E80-B3D7-43F3-A8C9-A8CB4D81571C}" type="datetimeFigureOut">
               <a:rPr lang="en-US" smtClean="0"/>
-              <a:t>11/21/2014</a:t>
+              <a:t>12/24/2014</a:t>
             </a:fld>
             <a:endParaRPr lang="en-US"/>
           </a:p>
@@ -1731,7 +1732,7 @@
           <a:p>
             <a:fld id="{A4AC1E80-B3D7-43F3-A8C9-A8CB4D81571C}" type="datetimeFigureOut">
               <a:rPr lang="en-US" smtClean="0"/>
-              <a:t>11/21/2014</a:t>
+              <a:t>12/24/2014</a:t>
             </a:fld>
             <a:endParaRPr lang="en-US"/>
           </a:p>
@@ -1826,7 +1827,7 @@
           <a:p>
             <a:fld id="{A4AC1E80-B3D7-43F3-A8C9-A8CB4D81571C}" type="datetimeFigureOut">
               <a:rPr lang="en-US" smtClean="0"/>
-              <a:t>11/21/2014</a:t>
+              <a:t>12/24/2014</a:t>
             </a:fld>
             <a:endParaRPr lang="en-US"/>
           </a:p>
@@ -2103,7 +2104,7 @@
           <a:p>
             <a:fld id="{A4AC1E80-B3D7-43F3-A8C9-A8CB4D81571C}" type="datetimeFigureOut">
               <a:rPr lang="en-US" smtClean="0"/>
-              <a:t>11/21/2014</a:t>
+              <a:t>12/24/2014</a:t>
             </a:fld>
             <a:endParaRPr lang="en-US"/>
           </a:p>
@@ -2356,7 +2357,7 @@
           <a:p>
             <a:fld id="{A4AC1E80-B3D7-43F3-A8C9-A8CB4D81571C}" type="datetimeFigureOut">
               <a:rPr lang="en-US" smtClean="0"/>
-              <a:t>11/21/2014</a:t>
+              <a:t>12/24/2014</a:t>
             </a:fld>
             <a:endParaRPr lang="en-US"/>
           </a:p>
@@ -2569,7 +2570,7 @@
           <a:p>
             <a:fld id="{A4AC1E80-B3D7-43F3-A8C9-A8CB4D81571C}" type="datetimeFigureOut">
               <a:rPr lang="en-US" smtClean="0"/>
-              <a:t>11/21/2014</a:t>
+              <a:t>12/24/2014</a:t>
             </a:fld>
             <a:endParaRPr lang="en-US"/>
           </a:p>
@@ -6017,15 +6018,7 @@
                   <a:schemeClr val="tx1"/>
                 </a:solidFill>
               </a:rPr>
-              <a:t>Sensor </a:t>
-            </a:r>
-            <a:r>
-              <a:rPr lang="en-US" sz="1000" dirty="0" smtClean="0">
-                <a:solidFill>
-                  <a:schemeClr val="tx1"/>
-                </a:solidFill>
-              </a:rPr>
-              <a:t>Type</a:t>
+              <a:t>Sensor Type</a:t>
             </a:r>
           </a:p>
           <a:p>
@@ -6614,15 +6607,7 @@
                   <a:schemeClr val="tx1"/>
                 </a:solidFill>
               </a:rPr>
-              <a:t>Sensor </a:t>
-            </a:r>
-            <a:r>
-              <a:rPr lang="en-US" sz="1000" dirty="0" smtClean="0">
-                <a:solidFill>
-                  <a:schemeClr val="tx1"/>
-                </a:solidFill>
-              </a:rPr>
-              <a:t>Type</a:t>
+              <a:t>Sensor Type</a:t>
             </a:r>
           </a:p>
           <a:p>
@@ -10671,6 +10656,54 @@
               </a:rPr>
               <a:t>DEVICE_PROT_DATA_TYPE</a:t>
             </a:r>
+          </a:p>
+        </p:txBody>
+      </p:sp>
+      <p:sp>
+        <p:nvSpPr>
+          <p:cNvPr id="46" name="Rounded Rectangle 45"/>
+          <p:cNvSpPr/>
+          <p:nvPr/>
+        </p:nvSpPr>
+        <p:spPr>
+          <a:xfrm>
+            <a:off x="2894875" y="2553998"/>
+            <a:ext cx="1913860" cy="273125"/>
+          </a:xfrm>
+          <a:prstGeom prst="roundRect">
+            <a:avLst/>
+          </a:prstGeom>
+          <a:noFill/>
+        </p:spPr>
+        <p:style>
+          <a:lnRef idx="2">
+            <a:schemeClr val="accent1">
+              <a:shade val="50000"/>
+            </a:schemeClr>
+          </a:lnRef>
+          <a:fillRef idx="1">
+            <a:schemeClr val="accent1"/>
+          </a:fillRef>
+          <a:effectRef idx="0">
+            <a:schemeClr val="accent1"/>
+          </a:effectRef>
+          <a:fontRef idx="minor">
+            <a:schemeClr val="lt1"/>
+          </a:fontRef>
+        </p:style>
+        <p:txBody>
+          <a:bodyPr rtlCol="0" anchor="ctr"/>
+          <a:lstStyle/>
+          <a:p>
+            <a:pPr algn="ctr"/>
+            <a:r>
+              <a:rPr lang="en-US" sz="1000">
+                <a:solidFill>
+                  <a:schemeClr val="tx1"/>
+                </a:solidFill>
+              </a:rPr>
+              <a:t>DEVICE_PROT_CONNECT_REQ</a:t>
+            </a:r>
             <a:endParaRPr lang="en-US" sz="1000" dirty="0">
               <a:solidFill>
                 <a:schemeClr val="tx1"/>
@@ -10681,13 +10714,13 @@
       </p:sp>
       <p:sp>
         <p:nvSpPr>
-          <p:cNvPr id="46" name="Rounded Rectangle 45"/>
+          <p:cNvPr id="47" name="Rounded Rectangle 46"/>
           <p:cNvSpPr/>
           <p:nvPr/>
         </p:nvSpPr>
         <p:spPr>
           <a:xfrm>
-            <a:off x="2894875" y="2553998"/>
+            <a:off x="2894875" y="2865028"/>
             <a:ext cx="1913860" cy="273125"/>
           </a:xfrm>
           <a:prstGeom prst="roundRect">
@@ -10717,31 +10750,26 @@
           <a:p>
             <a:pPr algn="ctr"/>
             <a:r>
-              <a:rPr lang="en-US" sz="1000">
+              <a:rPr lang="en-US" sz="1000" dirty="0">
                 <a:solidFill>
                   <a:schemeClr val="tx1"/>
                 </a:solidFill>
               </a:rPr>
-              <a:t>DEVICE_PROT_CONNECT_REQ</a:t>
-            </a:r>
-            <a:endParaRPr lang="en-US" sz="1000" dirty="0">
-              <a:solidFill>
-                <a:schemeClr val="tx1"/>
-              </a:solidFill>
-            </a:endParaRPr>
-          </a:p>
-        </p:txBody>
-      </p:sp>
-      <p:sp>
-        <p:nvSpPr>
-          <p:cNvPr id="47" name="Rounded Rectangle 46"/>
+              <a:t>DEVICE_PROT_CONNECT_ADDR</a:t>
+            </a:r>
+          </a:p>
+        </p:txBody>
+      </p:sp>
+      <p:sp>
+        <p:nvSpPr>
+          <p:cNvPr id="48" name="Rounded Rectangle 47"/>
           <p:cNvSpPr/>
           <p:nvPr/>
         </p:nvSpPr>
         <p:spPr>
           <a:xfrm>
-            <a:off x="2894875" y="2865028"/>
-            <a:ext cx="1913860" cy="273125"/>
+            <a:off x="2894875" y="3176058"/>
+            <a:ext cx="1913860" cy="259674"/>
           </a:xfrm>
           <a:prstGeom prst="roundRect">
             <a:avLst/>
@@ -10775,66 +10803,8 @@
                   <a:schemeClr val="tx1"/>
                 </a:solidFill>
               </a:rPr>
-              <a:t>DEVICE_PROT_CONNECT_ADDR</a:t>
-            </a:r>
-            <a:endParaRPr lang="en-US" sz="1000" dirty="0">
-              <a:solidFill>
-                <a:schemeClr val="tx1"/>
-              </a:solidFill>
-            </a:endParaRPr>
-          </a:p>
-        </p:txBody>
-      </p:sp>
-      <p:sp>
-        <p:nvSpPr>
-          <p:cNvPr id="48" name="Rounded Rectangle 47"/>
-          <p:cNvSpPr/>
-          <p:nvPr/>
-        </p:nvSpPr>
-        <p:spPr>
-          <a:xfrm>
-            <a:off x="2894875" y="3176058"/>
-            <a:ext cx="1913860" cy="259674"/>
-          </a:xfrm>
-          <a:prstGeom prst="roundRect">
-            <a:avLst/>
-          </a:prstGeom>
-          <a:noFill/>
-        </p:spPr>
-        <p:style>
-          <a:lnRef idx="2">
-            <a:schemeClr val="accent1">
-              <a:shade val="50000"/>
-            </a:schemeClr>
-          </a:lnRef>
-          <a:fillRef idx="1">
-            <a:schemeClr val="accent1"/>
-          </a:fillRef>
-          <a:effectRef idx="0">
-            <a:schemeClr val="accent1"/>
-          </a:effectRef>
-          <a:fontRef idx="minor">
-            <a:schemeClr val="lt1"/>
-          </a:fontRef>
-        </p:style>
-        <p:txBody>
-          <a:bodyPr rtlCol="0" anchor="ctr"/>
-          <a:lstStyle/>
-          <a:p>
-            <a:pPr algn="ctr"/>
-            <a:r>
-              <a:rPr lang="en-US" sz="1000" dirty="0">
-                <a:solidFill>
-                  <a:schemeClr val="tx1"/>
-                </a:solidFill>
-              </a:rPr>
               <a:t>DEVICE_PROT_CONNECT_CHK</a:t>
             </a:r>
-            <a:endParaRPr lang="en-US" sz="1000" dirty="0">
-              <a:solidFill>
-                <a:schemeClr val="tx1"/>
-              </a:solidFill>
-            </a:endParaRPr>
           </a:p>
         </p:txBody>
       </p:sp>
@@ -11087,11 +11057,6 @@
               </a:rPr>
               <a:t>SENSOR_CMD_RELAY</a:t>
             </a:r>
-            <a:endParaRPr lang="en-US" sz="1000" dirty="0">
-              <a:solidFill>
-                <a:schemeClr val="tx1"/>
-              </a:solidFill>
-            </a:endParaRPr>
           </a:p>
         </p:txBody>
       </p:sp>
@@ -11140,11 +11105,6 @@
               </a:rPr>
               <a:t>SENSOR_CMD_RELAY_RGB</a:t>
             </a:r>
-            <a:endParaRPr lang="en-US" sz="1000" dirty="0">
-              <a:solidFill>
-                <a:schemeClr val="tx1"/>
-              </a:solidFill>
-            </a:endParaRPr>
           </a:p>
         </p:txBody>
       </p:sp>
@@ -12592,6 +12552,1441 @@
     <p:extLst>
       <p:ext uri="{BB962C8B-B14F-4D97-AF65-F5344CB8AC3E}">
         <p14:creationId xmlns:p14="http://schemas.microsoft.com/office/powerpoint/2010/main" val="2951859519"/>
+      </p:ext>
+    </p:extLst>
+  </p:cSld>
+  <p:clrMapOvr>
+    <a:masterClrMapping/>
+  </p:clrMapOvr>
+  <p:timing>
+    <p:tnLst>
+      <p:par>
+        <p:cTn id="1" dur="indefinite" restart="never" nodeType="tmRoot"/>
+      </p:par>
+    </p:tnLst>
+  </p:timing>
+</p:sld>
+</file>
+
+<file path=ppt/slides/slide7.xml><?xml version="1.0" encoding="utf-8"?>
+<p:sld xmlns:a="http://schemas.openxmlformats.org/drawingml/2006/main" xmlns:r="http://schemas.openxmlformats.org/officeDocument/2006/relationships" xmlns:p="http://schemas.openxmlformats.org/presentationml/2006/main">
+  <p:cSld>
+    <p:spTree>
+      <p:nvGrpSpPr>
+        <p:cNvPr id="1" name=""/>
+        <p:cNvGrpSpPr/>
+        <p:nvPr/>
+      </p:nvGrpSpPr>
+      <p:grpSpPr>
+        <a:xfrm>
+          <a:off x="0" y="0"/>
+          <a:ext cx="0" cy="0"/>
+          <a:chOff x="0" y="0"/>
+          <a:chExt cx="0" cy="0"/>
+        </a:xfrm>
+      </p:grpSpPr>
+      <p:sp>
+        <p:nvSpPr>
+          <p:cNvPr id="4" name="TextBox 3"/>
+          <p:cNvSpPr txBox="1"/>
+          <p:nvPr/>
+        </p:nvSpPr>
+        <p:spPr>
+          <a:xfrm>
+            <a:off x="5806950" y="2864166"/>
+            <a:ext cx="638316" cy="261610"/>
+          </a:xfrm>
+          <a:prstGeom prst="rect">
+            <a:avLst/>
+          </a:prstGeom>
+          <a:noFill/>
+        </p:spPr>
+        <p:txBody>
+          <a:bodyPr wrap="none" rtlCol="0">
+            <a:spAutoFit/>
+          </a:bodyPr>
+          <a:lstStyle/>
+          <a:p>
+            <a:r>
+              <a:rPr lang="en-US" sz="1100" dirty="0" smtClean="0"/>
+              <a:t>Node.JS</a:t>
+            </a:r>
+            <a:endParaRPr lang="en-US" sz="1100" dirty="0"/>
+          </a:p>
+        </p:txBody>
+      </p:sp>
+      <p:sp>
+        <p:nvSpPr>
+          <p:cNvPr id="6" name="Rectangle 5"/>
+          <p:cNvSpPr/>
+          <p:nvPr/>
+        </p:nvSpPr>
+        <p:spPr>
+          <a:xfrm>
+            <a:off x="5441133" y="3125776"/>
+            <a:ext cx="1348966" cy="1844577"/>
+          </a:xfrm>
+          <a:prstGeom prst="rect">
+            <a:avLst/>
+          </a:prstGeom>
+          <a:noFill/>
+          <a:ln w="3175">
+            <a:prstDash val="dash"/>
+          </a:ln>
+        </p:spPr>
+        <p:style>
+          <a:lnRef idx="2">
+            <a:schemeClr val="accent1">
+              <a:shade val="50000"/>
+            </a:schemeClr>
+          </a:lnRef>
+          <a:fillRef idx="1">
+            <a:schemeClr val="accent1"/>
+          </a:fillRef>
+          <a:effectRef idx="0">
+            <a:schemeClr val="accent1"/>
+          </a:effectRef>
+          <a:fontRef idx="minor">
+            <a:schemeClr val="lt1"/>
+          </a:fontRef>
+        </p:style>
+        <p:txBody>
+          <a:bodyPr rtlCol="0" anchor="ctr"/>
+          <a:lstStyle/>
+          <a:p>
+            <a:pPr algn="ctr"/>
+            <a:endParaRPr lang="en-US" sz="1000" dirty="0">
+              <a:solidFill>
+                <a:schemeClr val="tx1"/>
+              </a:solidFill>
+            </a:endParaRPr>
+          </a:p>
+        </p:txBody>
+      </p:sp>
+      <p:sp>
+        <p:nvSpPr>
+          <p:cNvPr id="9" name="Rectangle 8"/>
+          <p:cNvSpPr/>
+          <p:nvPr/>
+        </p:nvSpPr>
+        <p:spPr>
+          <a:xfrm>
+            <a:off x="2915216" y="3125777"/>
+            <a:ext cx="1327302" cy="1844576"/>
+          </a:xfrm>
+          <a:prstGeom prst="rect">
+            <a:avLst/>
+          </a:prstGeom>
+          <a:noFill/>
+          <a:ln w="3175">
+            <a:prstDash val="dash"/>
+          </a:ln>
+        </p:spPr>
+        <p:style>
+          <a:lnRef idx="2">
+            <a:schemeClr val="accent1">
+              <a:shade val="50000"/>
+            </a:schemeClr>
+          </a:lnRef>
+          <a:fillRef idx="1">
+            <a:schemeClr val="accent1"/>
+          </a:fillRef>
+          <a:effectRef idx="0">
+            <a:schemeClr val="accent1"/>
+          </a:effectRef>
+          <a:fontRef idx="minor">
+            <a:schemeClr val="lt1"/>
+          </a:fontRef>
+        </p:style>
+        <p:txBody>
+          <a:bodyPr rtlCol="0" anchor="ctr"/>
+          <a:lstStyle/>
+          <a:p>
+            <a:pPr algn="ctr"/>
+            <a:endParaRPr lang="en-US" sz="1000" dirty="0">
+              <a:solidFill>
+                <a:schemeClr val="tx1"/>
+              </a:solidFill>
+            </a:endParaRPr>
+          </a:p>
+        </p:txBody>
+      </p:sp>
+      <p:sp>
+        <p:nvSpPr>
+          <p:cNvPr id="10" name="TextBox 9"/>
+          <p:cNvSpPr txBox="1"/>
+          <p:nvPr/>
+        </p:nvSpPr>
+        <p:spPr>
+          <a:xfrm>
+            <a:off x="2987000" y="2864166"/>
+            <a:ext cx="1178528" cy="261610"/>
+          </a:xfrm>
+          <a:prstGeom prst="rect">
+            <a:avLst/>
+          </a:prstGeom>
+          <a:noFill/>
+        </p:spPr>
+        <p:txBody>
+          <a:bodyPr wrap="none" rtlCol="0">
+            <a:spAutoFit/>
+          </a:bodyPr>
+          <a:lstStyle/>
+          <a:p>
+            <a:r>
+              <a:rPr lang="en-US" sz="1100" dirty="0" smtClean="0"/>
+              <a:t>Linux Sensors FW</a:t>
+            </a:r>
+            <a:endParaRPr lang="en-US" sz="1100" dirty="0"/>
+          </a:p>
+        </p:txBody>
+      </p:sp>
+      <p:sp>
+        <p:nvSpPr>
+          <p:cNvPr id="11" name="Rectangle 10"/>
+          <p:cNvSpPr/>
+          <p:nvPr/>
+        </p:nvSpPr>
+        <p:spPr>
+          <a:xfrm>
+            <a:off x="3043121" y="3668753"/>
+            <a:ext cx="1102393" cy="310741"/>
+          </a:xfrm>
+          <a:prstGeom prst="rect">
+            <a:avLst/>
+          </a:prstGeom>
+          <a:solidFill>
+            <a:schemeClr val="accent1">
+              <a:lumMod val="40000"/>
+              <a:lumOff val="60000"/>
+            </a:schemeClr>
+          </a:solidFill>
+        </p:spPr>
+        <p:style>
+          <a:lnRef idx="2">
+            <a:schemeClr val="accent1">
+              <a:shade val="50000"/>
+            </a:schemeClr>
+          </a:lnRef>
+          <a:fillRef idx="1">
+            <a:schemeClr val="accent1"/>
+          </a:fillRef>
+          <a:effectRef idx="0">
+            <a:schemeClr val="accent1"/>
+          </a:effectRef>
+          <a:fontRef idx="minor">
+            <a:schemeClr val="lt1"/>
+          </a:fontRef>
+        </p:style>
+        <p:txBody>
+          <a:bodyPr rtlCol="0" anchor="ctr"/>
+          <a:lstStyle/>
+          <a:p>
+            <a:pPr algn="ctr"/>
+            <a:r>
+              <a:rPr lang="en-US" sz="1000" dirty="0" smtClean="0">
+                <a:solidFill>
+                  <a:schemeClr val="tx1"/>
+                </a:solidFill>
+              </a:rPr>
+              <a:t>Node.JS Request Listener</a:t>
+            </a:r>
+            <a:endParaRPr lang="en-US" sz="1000" dirty="0">
+              <a:solidFill>
+                <a:schemeClr val="tx1"/>
+              </a:solidFill>
+            </a:endParaRPr>
+          </a:p>
+        </p:txBody>
+      </p:sp>
+      <p:sp>
+        <p:nvSpPr>
+          <p:cNvPr id="13" name="Rectangle 12"/>
+          <p:cNvSpPr/>
+          <p:nvPr/>
+        </p:nvSpPr>
+        <p:spPr>
+          <a:xfrm>
+            <a:off x="5574909" y="3248756"/>
+            <a:ext cx="1102393" cy="310741"/>
+          </a:xfrm>
+          <a:prstGeom prst="rect">
+            <a:avLst/>
+          </a:prstGeom>
+          <a:solidFill>
+            <a:schemeClr val="accent1">
+              <a:lumMod val="40000"/>
+              <a:lumOff val="60000"/>
+            </a:schemeClr>
+          </a:solidFill>
+        </p:spPr>
+        <p:style>
+          <a:lnRef idx="2">
+            <a:schemeClr val="accent1">
+              <a:shade val="50000"/>
+            </a:schemeClr>
+          </a:lnRef>
+          <a:fillRef idx="1">
+            <a:schemeClr val="accent1"/>
+          </a:fillRef>
+          <a:effectRef idx="0">
+            <a:schemeClr val="accent1"/>
+          </a:effectRef>
+          <a:fontRef idx="minor">
+            <a:schemeClr val="lt1"/>
+          </a:fontRef>
+        </p:style>
+        <p:txBody>
+          <a:bodyPr rtlCol="0" anchor="ctr"/>
+          <a:lstStyle/>
+          <a:p>
+            <a:pPr algn="ctr"/>
+            <a:r>
+              <a:rPr lang="en-US" sz="1000" dirty="0" smtClean="0">
+                <a:solidFill>
+                  <a:schemeClr val="tx1"/>
+                </a:solidFill>
+              </a:rPr>
+              <a:t>Sensors FW DB Request Listener</a:t>
+            </a:r>
+            <a:endParaRPr lang="en-US" sz="1000" dirty="0">
+              <a:solidFill>
+                <a:schemeClr val="tx1"/>
+              </a:solidFill>
+            </a:endParaRPr>
+          </a:p>
+        </p:txBody>
+      </p:sp>
+      <p:sp>
+        <p:nvSpPr>
+          <p:cNvPr id="14" name="Rectangle 13"/>
+          <p:cNvSpPr/>
+          <p:nvPr/>
+        </p:nvSpPr>
+        <p:spPr>
+          <a:xfrm>
+            <a:off x="8107641" y="3125776"/>
+            <a:ext cx="1404182" cy="1844577"/>
+          </a:xfrm>
+          <a:prstGeom prst="rect">
+            <a:avLst/>
+          </a:prstGeom>
+          <a:noFill/>
+          <a:ln w="3175">
+            <a:prstDash val="dash"/>
+          </a:ln>
+        </p:spPr>
+        <p:style>
+          <a:lnRef idx="2">
+            <a:schemeClr val="accent1">
+              <a:shade val="50000"/>
+            </a:schemeClr>
+          </a:lnRef>
+          <a:fillRef idx="1">
+            <a:schemeClr val="accent1"/>
+          </a:fillRef>
+          <a:effectRef idx="0">
+            <a:schemeClr val="accent1"/>
+          </a:effectRef>
+          <a:fontRef idx="minor">
+            <a:schemeClr val="lt1"/>
+          </a:fontRef>
+        </p:style>
+        <p:txBody>
+          <a:bodyPr rtlCol="0" anchor="ctr"/>
+          <a:lstStyle/>
+          <a:p>
+            <a:pPr algn="ctr"/>
+            <a:endParaRPr lang="en-US" sz="1000" dirty="0">
+              <a:solidFill>
+                <a:schemeClr val="tx1"/>
+              </a:solidFill>
+            </a:endParaRPr>
+          </a:p>
+        </p:txBody>
+      </p:sp>
+      <p:sp>
+        <p:nvSpPr>
+          <p:cNvPr id="15" name="TextBox 14"/>
+          <p:cNvSpPr txBox="1"/>
+          <p:nvPr/>
+        </p:nvSpPr>
+        <p:spPr>
+          <a:xfrm>
+            <a:off x="8411513" y="2864166"/>
+            <a:ext cx="830677" cy="261610"/>
+          </a:xfrm>
+          <a:prstGeom prst="rect">
+            <a:avLst/>
+          </a:prstGeom>
+          <a:noFill/>
+        </p:spPr>
+        <p:txBody>
+          <a:bodyPr wrap="none" rtlCol="0">
+            <a:spAutoFit/>
+          </a:bodyPr>
+          <a:lstStyle/>
+          <a:p>
+            <a:r>
+              <a:rPr lang="en-US" sz="1100" dirty="0" smtClean="0"/>
+              <a:t>Application</a:t>
+            </a:r>
+            <a:endParaRPr lang="en-US" sz="1100" dirty="0"/>
+          </a:p>
+        </p:txBody>
+      </p:sp>
+      <p:sp>
+        <p:nvSpPr>
+          <p:cNvPr id="17" name="TextBox 16"/>
+          <p:cNvSpPr txBox="1"/>
+          <p:nvPr/>
+        </p:nvSpPr>
+        <p:spPr>
+          <a:xfrm>
+            <a:off x="5748439" y="1775056"/>
+            <a:ext cx="755335" cy="261610"/>
+          </a:xfrm>
+          <a:prstGeom prst="rect">
+            <a:avLst/>
+          </a:prstGeom>
+          <a:noFill/>
+        </p:spPr>
+        <p:txBody>
+          <a:bodyPr wrap="none" rtlCol="0">
+            <a:spAutoFit/>
+          </a:bodyPr>
+          <a:lstStyle/>
+          <a:p>
+            <a:r>
+              <a:rPr lang="en-US" sz="1100" dirty="0" err="1" smtClean="0"/>
+              <a:t>MongoDB</a:t>
+            </a:r>
+            <a:endParaRPr lang="en-US" sz="1100" dirty="0"/>
+          </a:p>
+        </p:txBody>
+      </p:sp>
+      <p:sp>
+        <p:nvSpPr>
+          <p:cNvPr id="18" name="Rectangle 17"/>
+          <p:cNvSpPr/>
+          <p:nvPr/>
+        </p:nvSpPr>
+        <p:spPr>
+          <a:xfrm>
+            <a:off x="5441133" y="2036666"/>
+            <a:ext cx="1348966" cy="525861"/>
+          </a:xfrm>
+          <a:prstGeom prst="rect">
+            <a:avLst/>
+          </a:prstGeom>
+          <a:noFill/>
+          <a:ln w="3175">
+            <a:prstDash val="dash"/>
+          </a:ln>
+        </p:spPr>
+        <p:style>
+          <a:lnRef idx="2">
+            <a:schemeClr val="accent1">
+              <a:shade val="50000"/>
+            </a:schemeClr>
+          </a:lnRef>
+          <a:fillRef idx="1">
+            <a:schemeClr val="accent1"/>
+          </a:fillRef>
+          <a:effectRef idx="0">
+            <a:schemeClr val="accent1"/>
+          </a:effectRef>
+          <a:fontRef idx="minor">
+            <a:schemeClr val="lt1"/>
+          </a:fontRef>
+        </p:style>
+        <p:txBody>
+          <a:bodyPr rtlCol="0" anchor="ctr"/>
+          <a:lstStyle/>
+          <a:p>
+            <a:pPr algn="ctr"/>
+            <a:endParaRPr lang="en-US" sz="1000" dirty="0">
+              <a:solidFill>
+                <a:schemeClr val="tx1"/>
+              </a:solidFill>
+            </a:endParaRPr>
+          </a:p>
+        </p:txBody>
+      </p:sp>
+      <p:sp>
+        <p:nvSpPr>
+          <p:cNvPr id="19" name="Rectangle 18"/>
+          <p:cNvSpPr/>
+          <p:nvPr/>
+        </p:nvSpPr>
+        <p:spPr>
+          <a:xfrm>
+            <a:off x="5574911" y="2142905"/>
+            <a:ext cx="1102393" cy="310741"/>
+          </a:xfrm>
+          <a:prstGeom prst="rect">
+            <a:avLst/>
+          </a:prstGeom>
+          <a:solidFill>
+            <a:schemeClr val="accent6">
+              <a:lumMod val="60000"/>
+              <a:lumOff val="40000"/>
+            </a:schemeClr>
+          </a:solidFill>
+        </p:spPr>
+        <p:style>
+          <a:lnRef idx="2">
+            <a:schemeClr val="accent1">
+              <a:shade val="50000"/>
+            </a:schemeClr>
+          </a:lnRef>
+          <a:fillRef idx="1">
+            <a:schemeClr val="accent1"/>
+          </a:fillRef>
+          <a:effectRef idx="0">
+            <a:schemeClr val="accent1"/>
+          </a:effectRef>
+          <a:fontRef idx="minor">
+            <a:schemeClr val="lt1"/>
+          </a:fontRef>
+        </p:style>
+        <p:txBody>
+          <a:bodyPr rtlCol="0" anchor="ctr"/>
+          <a:lstStyle/>
+          <a:p>
+            <a:pPr algn="ctr"/>
+            <a:r>
+              <a:rPr lang="en-US" sz="1000" dirty="0" smtClean="0">
+                <a:solidFill>
+                  <a:schemeClr val="tx1"/>
+                </a:solidFill>
+              </a:rPr>
+              <a:t>Database</a:t>
+            </a:r>
+            <a:endParaRPr lang="en-US" sz="1000" dirty="0">
+              <a:solidFill>
+                <a:schemeClr val="tx1"/>
+              </a:solidFill>
+            </a:endParaRPr>
+          </a:p>
+        </p:txBody>
+      </p:sp>
+      <p:sp>
+        <p:nvSpPr>
+          <p:cNvPr id="20" name="Rectangle 19"/>
+          <p:cNvSpPr/>
+          <p:nvPr/>
+        </p:nvSpPr>
+        <p:spPr>
+          <a:xfrm>
+            <a:off x="5574911" y="4119777"/>
+            <a:ext cx="1102393" cy="310741"/>
+          </a:xfrm>
+          <a:prstGeom prst="rect">
+            <a:avLst/>
+          </a:prstGeom>
+          <a:solidFill>
+            <a:schemeClr val="accent6">
+              <a:lumMod val="60000"/>
+              <a:lumOff val="40000"/>
+            </a:schemeClr>
+          </a:solidFill>
+        </p:spPr>
+        <p:style>
+          <a:lnRef idx="2">
+            <a:schemeClr val="accent1">
+              <a:shade val="50000"/>
+            </a:schemeClr>
+          </a:lnRef>
+          <a:fillRef idx="1">
+            <a:schemeClr val="accent1"/>
+          </a:fillRef>
+          <a:effectRef idx="0">
+            <a:schemeClr val="accent1"/>
+          </a:effectRef>
+          <a:fontRef idx="minor">
+            <a:schemeClr val="lt1"/>
+          </a:fontRef>
+        </p:style>
+        <p:txBody>
+          <a:bodyPr rtlCol="0" anchor="ctr"/>
+          <a:lstStyle/>
+          <a:p>
+            <a:pPr algn="ctr"/>
+            <a:r>
+              <a:rPr lang="en-US" sz="1000" dirty="0" smtClean="0">
+                <a:solidFill>
+                  <a:schemeClr val="tx1"/>
+                </a:solidFill>
+              </a:rPr>
+              <a:t>REST Service</a:t>
+            </a:r>
+            <a:endParaRPr lang="en-US" sz="1000" dirty="0">
+              <a:solidFill>
+                <a:schemeClr val="tx1"/>
+              </a:solidFill>
+            </a:endParaRPr>
+          </a:p>
+        </p:txBody>
+      </p:sp>
+      <p:sp>
+        <p:nvSpPr>
+          <p:cNvPr id="21" name="Rectangle 20"/>
+          <p:cNvSpPr/>
+          <p:nvPr/>
+        </p:nvSpPr>
+        <p:spPr>
+          <a:xfrm>
+            <a:off x="8275654" y="4541417"/>
+            <a:ext cx="1102393" cy="310741"/>
+          </a:xfrm>
+          <a:prstGeom prst="rect">
+            <a:avLst/>
+          </a:prstGeom>
+          <a:solidFill>
+            <a:schemeClr val="accent6">
+              <a:lumMod val="60000"/>
+              <a:lumOff val="40000"/>
+            </a:schemeClr>
+          </a:solidFill>
+        </p:spPr>
+        <p:style>
+          <a:lnRef idx="2">
+            <a:schemeClr val="accent1">
+              <a:shade val="50000"/>
+            </a:schemeClr>
+          </a:lnRef>
+          <a:fillRef idx="1">
+            <a:schemeClr val="accent1"/>
+          </a:fillRef>
+          <a:effectRef idx="0">
+            <a:schemeClr val="accent1"/>
+          </a:effectRef>
+          <a:fontRef idx="minor">
+            <a:schemeClr val="lt1"/>
+          </a:fontRef>
+        </p:style>
+        <p:txBody>
+          <a:bodyPr rtlCol="0" anchor="ctr"/>
+          <a:lstStyle/>
+          <a:p>
+            <a:pPr algn="ctr"/>
+            <a:r>
+              <a:rPr lang="en-US" sz="1000" dirty="0" smtClean="0">
+                <a:solidFill>
+                  <a:schemeClr val="tx1"/>
+                </a:solidFill>
+              </a:rPr>
+              <a:t>SSE Binds</a:t>
+            </a:r>
+            <a:endParaRPr lang="en-US" sz="1000" dirty="0">
+              <a:solidFill>
+                <a:schemeClr val="tx1"/>
+              </a:solidFill>
+            </a:endParaRPr>
+          </a:p>
+        </p:txBody>
+      </p:sp>
+      <p:sp>
+        <p:nvSpPr>
+          <p:cNvPr id="22" name="Rectangle 21"/>
+          <p:cNvSpPr/>
+          <p:nvPr/>
+        </p:nvSpPr>
+        <p:spPr>
+          <a:xfrm>
+            <a:off x="5574911" y="3670325"/>
+            <a:ext cx="1102393" cy="311271"/>
+          </a:xfrm>
+          <a:prstGeom prst="rect">
+            <a:avLst/>
+          </a:prstGeom>
+          <a:noFill/>
+          <a:ln w="3175">
+            <a:prstDash val="dash"/>
+          </a:ln>
+        </p:spPr>
+        <p:style>
+          <a:lnRef idx="2">
+            <a:schemeClr val="accent1">
+              <a:shade val="50000"/>
+            </a:schemeClr>
+          </a:lnRef>
+          <a:fillRef idx="1">
+            <a:schemeClr val="accent1"/>
+          </a:fillRef>
+          <a:effectRef idx="0">
+            <a:schemeClr val="accent1"/>
+          </a:effectRef>
+          <a:fontRef idx="minor">
+            <a:schemeClr val="lt1"/>
+          </a:fontRef>
+        </p:style>
+        <p:txBody>
+          <a:bodyPr rtlCol="0" anchor="ctr"/>
+          <a:lstStyle/>
+          <a:p>
+            <a:pPr algn="ctr"/>
+            <a:r>
+              <a:rPr lang="en-US" sz="1000" dirty="0" smtClean="0">
+                <a:solidFill>
+                  <a:schemeClr val="tx1"/>
+                </a:solidFill>
+              </a:rPr>
+              <a:t>Actions</a:t>
+            </a:r>
+            <a:endParaRPr lang="en-US" sz="1000" dirty="0">
+              <a:solidFill>
+                <a:schemeClr val="tx1"/>
+              </a:solidFill>
+            </a:endParaRPr>
+          </a:p>
+        </p:txBody>
+      </p:sp>
+      <p:cxnSp>
+        <p:nvCxnSpPr>
+          <p:cNvPr id="23" name="Straight Arrow Connector 22"/>
+          <p:cNvCxnSpPr>
+            <a:stCxn id="22" idx="1"/>
+            <a:endCxn id="11" idx="3"/>
+          </p:cNvCxnSpPr>
+          <p:nvPr/>
+        </p:nvCxnSpPr>
+        <p:spPr>
+          <a:xfrm flipH="1" flipV="1">
+            <a:off x="4145514" y="3824124"/>
+            <a:ext cx="1429397" cy="1837"/>
+          </a:xfrm>
+          <a:prstGeom prst="straightConnector1">
+            <a:avLst/>
+          </a:prstGeom>
+          <a:ln>
+            <a:tailEnd type="triangle"/>
+          </a:ln>
+        </p:spPr>
+        <p:style>
+          <a:lnRef idx="1">
+            <a:schemeClr val="accent1"/>
+          </a:lnRef>
+          <a:fillRef idx="0">
+            <a:schemeClr val="accent1"/>
+          </a:fillRef>
+          <a:effectRef idx="0">
+            <a:schemeClr val="accent1"/>
+          </a:effectRef>
+          <a:fontRef idx="minor">
+            <a:schemeClr val="tx1"/>
+          </a:fontRef>
+        </p:style>
+      </p:cxnSp>
+      <p:sp>
+        <p:nvSpPr>
+          <p:cNvPr id="28" name="Rectangle 27"/>
+          <p:cNvSpPr/>
+          <p:nvPr/>
+        </p:nvSpPr>
+        <p:spPr>
+          <a:xfrm>
+            <a:off x="5574909" y="4541418"/>
+            <a:ext cx="1102393" cy="310741"/>
+          </a:xfrm>
+          <a:prstGeom prst="rect">
+            <a:avLst/>
+          </a:prstGeom>
+          <a:solidFill>
+            <a:schemeClr val="accent6">
+              <a:lumMod val="60000"/>
+              <a:lumOff val="40000"/>
+            </a:schemeClr>
+          </a:solidFill>
+        </p:spPr>
+        <p:style>
+          <a:lnRef idx="2">
+            <a:schemeClr val="accent1">
+              <a:shade val="50000"/>
+            </a:schemeClr>
+          </a:lnRef>
+          <a:fillRef idx="1">
+            <a:schemeClr val="accent1"/>
+          </a:fillRef>
+          <a:effectRef idx="0">
+            <a:schemeClr val="accent1"/>
+          </a:effectRef>
+          <a:fontRef idx="minor">
+            <a:schemeClr val="lt1"/>
+          </a:fontRef>
+        </p:style>
+        <p:txBody>
+          <a:bodyPr rtlCol="0" anchor="ctr"/>
+          <a:lstStyle/>
+          <a:p>
+            <a:pPr algn="ctr"/>
+            <a:r>
+              <a:rPr lang="en-US" sz="1000" dirty="0" smtClean="0">
+                <a:solidFill>
+                  <a:schemeClr val="tx1"/>
+                </a:solidFill>
+              </a:rPr>
+              <a:t>SSE Push</a:t>
+            </a:r>
+            <a:endParaRPr lang="en-US" sz="1000" dirty="0">
+              <a:solidFill>
+                <a:schemeClr val="tx1"/>
+              </a:solidFill>
+            </a:endParaRPr>
+          </a:p>
+        </p:txBody>
+      </p:sp>
+      <p:cxnSp>
+        <p:nvCxnSpPr>
+          <p:cNvPr id="29" name="Straight Arrow Connector 28"/>
+          <p:cNvCxnSpPr>
+            <a:stCxn id="28" idx="3"/>
+            <a:endCxn id="21" idx="1"/>
+          </p:cNvCxnSpPr>
+          <p:nvPr/>
+        </p:nvCxnSpPr>
+        <p:spPr>
+          <a:xfrm flipV="1">
+            <a:off x="6677302" y="4696788"/>
+            <a:ext cx="1598352" cy="1"/>
+          </a:xfrm>
+          <a:prstGeom prst="straightConnector1">
+            <a:avLst/>
+          </a:prstGeom>
+          <a:ln>
+            <a:tailEnd type="triangle"/>
+          </a:ln>
+        </p:spPr>
+        <p:style>
+          <a:lnRef idx="1">
+            <a:schemeClr val="accent1"/>
+          </a:lnRef>
+          <a:fillRef idx="0">
+            <a:schemeClr val="accent1"/>
+          </a:fillRef>
+          <a:effectRef idx="0">
+            <a:schemeClr val="accent1"/>
+          </a:effectRef>
+          <a:fontRef idx="minor">
+            <a:schemeClr val="tx1"/>
+          </a:fontRef>
+        </p:style>
+      </p:cxnSp>
+      <p:sp>
+        <p:nvSpPr>
+          <p:cNvPr id="32" name="Rectangle 31"/>
+          <p:cNvSpPr/>
+          <p:nvPr/>
+        </p:nvSpPr>
+        <p:spPr>
+          <a:xfrm>
+            <a:off x="8275654" y="4119247"/>
+            <a:ext cx="1102393" cy="311271"/>
+          </a:xfrm>
+          <a:prstGeom prst="rect">
+            <a:avLst/>
+          </a:prstGeom>
+          <a:noFill/>
+          <a:ln w="3175">
+            <a:prstDash val="dash"/>
+          </a:ln>
+        </p:spPr>
+        <p:style>
+          <a:lnRef idx="2">
+            <a:schemeClr val="accent1">
+              <a:shade val="50000"/>
+            </a:schemeClr>
+          </a:lnRef>
+          <a:fillRef idx="1">
+            <a:schemeClr val="accent1"/>
+          </a:fillRef>
+          <a:effectRef idx="0">
+            <a:schemeClr val="accent1"/>
+          </a:effectRef>
+          <a:fontRef idx="minor">
+            <a:schemeClr val="lt1"/>
+          </a:fontRef>
+        </p:style>
+        <p:txBody>
+          <a:bodyPr rtlCol="0" anchor="ctr"/>
+          <a:lstStyle/>
+          <a:p>
+            <a:pPr algn="ctr"/>
+            <a:r>
+              <a:rPr lang="en-US" sz="1000" dirty="0">
+                <a:solidFill>
+                  <a:schemeClr val="tx1"/>
+                </a:solidFill>
+              </a:rPr>
+              <a:t>REST Service </a:t>
+            </a:r>
+            <a:r>
+              <a:rPr lang="en-US" sz="1000" dirty="0" smtClean="0">
+                <a:solidFill>
+                  <a:schemeClr val="tx1"/>
+                </a:solidFill>
+              </a:rPr>
+              <a:t>Requests</a:t>
+            </a:r>
+            <a:endParaRPr lang="en-US" sz="1000" dirty="0">
+              <a:solidFill>
+                <a:schemeClr val="tx1"/>
+              </a:solidFill>
+            </a:endParaRPr>
+          </a:p>
+        </p:txBody>
+      </p:sp>
+      <p:cxnSp>
+        <p:nvCxnSpPr>
+          <p:cNvPr id="33" name="Straight Arrow Connector 32"/>
+          <p:cNvCxnSpPr>
+            <a:stCxn id="32" idx="1"/>
+            <a:endCxn id="20" idx="3"/>
+          </p:cNvCxnSpPr>
+          <p:nvPr/>
+        </p:nvCxnSpPr>
+        <p:spPr>
+          <a:xfrm flipH="1">
+            <a:off x="6677304" y="4274883"/>
+            <a:ext cx="1598350" cy="265"/>
+          </a:xfrm>
+          <a:prstGeom prst="straightConnector1">
+            <a:avLst/>
+          </a:prstGeom>
+          <a:ln>
+            <a:headEnd type="triangle" w="med" len="med"/>
+            <a:tailEnd type="triangle" w="med" len="med"/>
+          </a:ln>
+        </p:spPr>
+        <p:style>
+          <a:lnRef idx="1">
+            <a:schemeClr val="accent1"/>
+          </a:lnRef>
+          <a:fillRef idx="0">
+            <a:schemeClr val="accent1"/>
+          </a:fillRef>
+          <a:effectRef idx="0">
+            <a:schemeClr val="accent1"/>
+          </a:effectRef>
+          <a:fontRef idx="minor">
+            <a:schemeClr val="tx1"/>
+          </a:fontRef>
+        </p:style>
+      </p:cxnSp>
+      <p:sp>
+        <p:nvSpPr>
+          <p:cNvPr id="36" name="Rectangle 35"/>
+          <p:cNvSpPr/>
+          <p:nvPr/>
+        </p:nvSpPr>
+        <p:spPr>
+          <a:xfrm>
+            <a:off x="3043121" y="4149343"/>
+            <a:ext cx="1102393" cy="702815"/>
+          </a:xfrm>
+          <a:prstGeom prst="rect">
+            <a:avLst/>
+          </a:prstGeom>
+          <a:solidFill>
+            <a:schemeClr val="accent2">
+              <a:lumMod val="60000"/>
+              <a:lumOff val="40000"/>
+            </a:schemeClr>
+          </a:solidFill>
+        </p:spPr>
+        <p:style>
+          <a:lnRef idx="2">
+            <a:schemeClr val="accent1">
+              <a:shade val="50000"/>
+            </a:schemeClr>
+          </a:lnRef>
+          <a:fillRef idx="1">
+            <a:schemeClr val="accent1"/>
+          </a:fillRef>
+          <a:effectRef idx="0">
+            <a:schemeClr val="accent1"/>
+          </a:effectRef>
+          <a:fontRef idx="minor">
+            <a:schemeClr val="lt1"/>
+          </a:fontRef>
+        </p:style>
+        <p:txBody>
+          <a:bodyPr rtlCol="0" anchor="ctr"/>
+          <a:lstStyle/>
+          <a:p>
+            <a:pPr algn="ctr"/>
+            <a:r>
+              <a:rPr lang="en-US" sz="1000" dirty="0" smtClean="0">
+                <a:solidFill>
+                  <a:schemeClr val="tx1"/>
+                </a:solidFill>
+              </a:rPr>
+              <a:t>Framework</a:t>
+            </a:r>
+            <a:endParaRPr lang="en-US" sz="1000" dirty="0">
+              <a:solidFill>
+                <a:schemeClr val="tx1"/>
+              </a:solidFill>
+            </a:endParaRPr>
+          </a:p>
+        </p:txBody>
+      </p:sp>
+      <p:cxnSp>
+        <p:nvCxnSpPr>
+          <p:cNvPr id="37" name="Straight Arrow Connector 36"/>
+          <p:cNvCxnSpPr>
+            <a:stCxn id="11" idx="2"/>
+            <a:endCxn id="36" idx="0"/>
+          </p:cNvCxnSpPr>
+          <p:nvPr/>
+        </p:nvCxnSpPr>
+        <p:spPr>
+          <a:xfrm>
+            <a:off x="3594318" y="3979494"/>
+            <a:ext cx="0" cy="169849"/>
+          </a:xfrm>
+          <a:prstGeom prst="straightConnector1">
+            <a:avLst/>
+          </a:prstGeom>
+          <a:ln>
+            <a:tailEnd type="triangle"/>
+          </a:ln>
+        </p:spPr>
+        <p:style>
+          <a:lnRef idx="1">
+            <a:schemeClr val="accent1"/>
+          </a:lnRef>
+          <a:fillRef idx="0">
+            <a:schemeClr val="accent1"/>
+          </a:fillRef>
+          <a:effectRef idx="0">
+            <a:schemeClr val="accent1"/>
+          </a:effectRef>
+          <a:fontRef idx="minor">
+            <a:schemeClr val="tx1"/>
+          </a:fontRef>
+        </p:style>
+      </p:cxnSp>
+      <p:sp>
+        <p:nvSpPr>
+          <p:cNvPr id="40" name="Rectangle 39"/>
+          <p:cNvSpPr/>
+          <p:nvPr/>
+        </p:nvSpPr>
+        <p:spPr>
+          <a:xfrm>
+            <a:off x="3040030" y="3248226"/>
+            <a:ext cx="1102393" cy="311271"/>
+          </a:xfrm>
+          <a:prstGeom prst="rect">
+            <a:avLst/>
+          </a:prstGeom>
+          <a:noFill/>
+          <a:ln w="3175">
+            <a:prstDash val="dash"/>
+          </a:ln>
+        </p:spPr>
+        <p:style>
+          <a:lnRef idx="2">
+            <a:schemeClr val="accent1">
+              <a:shade val="50000"/>
+            </a:schemeClr>
+          </a:lnRef>
+          <a:fillRef idx="1">
+            <a:schemeClr val="accent1"/>
+          </a:fillRef>
+          <a:effectRef idx="0">
+            <a:schemeClr val="accent1"/>
+          </a:effectRef>
+          <a:fontRef idx="minor">
+            <a:schemeClr val="lt1"/>
+          </a:fontRef>
+        </p:style>
+        <p:txBody>
+          <a:bodyPr rtlCol="0" anchor="ctr"/>
+          <a:lstStyle/>
+          <a:p>
+            <a:pPr algn="ctr"/>
+            <a:r>
+              <a:rPr lang="en-US" sz="1000" dirty="0" smtClean="0">
+                <a:solidFill>
+                  <a:schemeClr val="tx1"/>
+                </a:solidFill>
+              </a:rPr>
+              <a:t>Sensor Updates</a:t>
+            </a:r>
+            <a:endParaRPr lang="en-US" sz="1000" dirty="0">
+              <a:solidFill>
+                <a:schemeClr val="tx1"/>
+              </a:solidFill>
+            </a:endParaRPr>
+          </a:p>
+        </p:txBody>
+      </p:sp>
+      <p:cxnSp>
+        <p:nvCxnSpPr>
+          <p:cNvPr id="41" name="Straight Arrow Connector 40"/>
+          <p:cNvCxnSpPr>
+            <a:stCxn id="40" idx="3"/>
+            <a:endCxn id="13" idx="1"/>
+          </p:cNvCxnSpPr>
+          <p:nvPr/>
+        </p:nvCxnSpPr>
+        <p:spPr>
+          <a:xfrm>
+            <a:off x="4142423" y="3403862"/>
+            <a:ext cx="1432486" cy="265"/>
+          </a:xfrm>
+          <a:prstGeom prst="straightConnector1">
+            <a:avLst/>
+          </a:prstGeom>
+          <a:ln>
+            <a:tailEnd type="triangle"/>
+          </a:ln>
+        </p:spPr>
+        <p:style>
+          <a:lnRef idx="1">
+            <a:schemeClr val="accent1"/>
+          </a:lnRef>
+          <a:fillRef idx="0">
+            <a:schemeClr val="accent1"/>
+          </a:fillRef>
+          <a:effectRef idx="0">
+            <a:schemeClr val="accent1"/>
+          </a:effectRef>
+          <a:fontRef idx="minor">
+            <a:schemeClr val="tx1"/>
+          </a:fontRef>
+        </p:style>
+      </p:cxnSp>
+      <p:cxnSp>
+        <p:nvCxnSpPr>
+          <p:cNvPr id="44" name="Elbow Connector 43"/>
+          <p:cNvCxnSpPr>
+            <a:stCxn id="13" idx="3"/>
+            <a:endCxn id="19" idx="3"/>
+          </p:cNvCxnSpPr>
+          <p:nvPr/>
+        </p:nvCxnSpPr>
+        <p:spPr>
+          <a:xfrm flipV="1">
+            <a:off x="6677302" y="2298276"/>
+            <a:ext cx="2" cy="1105851"/>
+          </a:xfrm>
+          <a:prstGeom prst="bentConnector3">
+            <a:avLst>
+              <a:gd name="adj1" fmla="val 11430100000"/>
+            </a:avLst>
+          </a:prstGeom>
+          <a:ln>
+            <a:tailEnd type="triangle"/>
+          </a:ln>
+        </p:spPr>
+        <p:style>
+          <a:lnRef idx="1">
+            <a:schemeClr val="accent1"/>
+          </a:lnRef>
+          <a:fillRef idx="0">
+            <a:schemeClr val="accent1"/>
+          </a:fillRef>
+          <a:effectRef idx="0">
+            <a:schemeClr val="accent1"/>
+          </a:effectRef>
+          <a:fontRef idx="minor">
+            <a:schemeClr val="tx1"/>
+          </a:fontRef>
+        </p:style>
+      </p:cxnSp>
+      <p:cxnSp>
+        <p:nvCxnSpPr>
+          <p:cNvPr id="50" name="Straight Arrow Connector 49"/>
+          <p:cNvCxnSpPr>
+            <a:stCxn id="20" idx="0"/>
+            <a:endCxn id="22" idx="2"/>
+          </p:cNvCxnSpPr>
+          <p:nvPr/>
+        </p:nvCxnSpPr>
+        <p:spPr>
+          <a:xfrm flipV="1">
+            <a:off x="6126108" y="3981596"/>
+            <a:ext cx="0" cy="138181"/>
+          </a:xfrm>
+          <a:prstGeom prst="straightConnector1">
+            <a:avLst/>
+          </a:prstGeom>
+          <a:ln>
+            <a:tailEnd type="triangle"/>
+          </a:ln>
+        </p:spPr>
+        <p:style>
+          <a:lnRef idx="1">
+            <a:schemeClr val="accent1"/>
+          </a:lnRef>
+          <a:fillRef idx="0">
+            <a:schemeClr val="accent1"/>
+          </a:fillRef>
+          <a:effectRef idx="0">
+            <a:schemeClr val="accent1"/>
+          </a:effectRef>
+          <a:fontRef idx="minor">
+            <a:schemeClr val="tx1"/>
+          </a:fontRef>
+        </p:style>
+      </p:cxnSp>
+      <p:cxnSp>
+        <p:nvCxnSpPr>
+          <p:cNvPr id="53" name="Elbow Connector 52"/>
+          <p:cNvCxnSpPr>
+            <a:stCxn id="22" idx="3"/>
+            <a:endCxn id="19" idx="3"/>
+          </p:cNvCxnSpPr>
+          <p:nvPr/>
+        </p:nvCxnSpPr>
+        <p:spPr>
+          <a:xfrm flipV="1">
+            <a:off x="6677304" y="2298276"/>
+            <a:ext cx="12700" cy="1527685"/>
+          </a:xfrm>
+          <a:prstGeom prst="bentConnector3">
+            <a:avLst>
+              <a:gd name="adj1" fmla="val 1800000"/>
+            </a:avLst>
+          </a:prstGeom>
+          <a:ln>
+            <a:tailEnd type="triangle"/>
+          </a:ln>
+        </p:spPr>
+        <p:style>
+          <a:lnRef idx="1">
+            <a:schemeClr val="accent1"/>
+          </a:lnRef>
+          <a:fillRef idx="0">
+            <a:schemeClr val="accent1"/>
+          </a:fillRef>
+          <a:effectRef idx="0">
+            <a:schemeClr val="accent1"/>
+          </a:effectRef>
+          <a:fontRef idx="minor">
+            <a:schemeClr val="tx1"/>
+          </a:fontRef>
+        </p:style>
+      </p:cxnSp>
+      <p:sp>
+        <p:nvSpPr>
+          <p:cNvPr id="56" name="Rectangle 55"/>
+          <p:cNvSpPr/>
+          <p:nvPr/>
+        </p:nvSpPr>
+        <p:spPr>
+          <a:xfrm>
+            <a:off x="8275654" y="3226448"/>
+            <a:ext cx="1102393" cy="737429"/>
+          </a:xfrm>
+          <a:prstGeom prst="rect">
+            <a:avLst/>
+          </a:prstGeom>
+          <a:solidFill>
+            <a:schemeClr val="accent2">
+              <a:lumMod val="60000"/>
+              <a:lumOff val="40000"/>
+            </a:schemeClr>
+          </a:solidFill>
+        </p:spPr>
+        <p:style>
+          <a:lnRef idx="2">
+            <a:schemeClr val="accent1">
+              <a:shade val="50000"/>
+            </a:schemeClr>
+          </a:lnRef>
+          <a:fillRef idx="1">
+            <a:schemeClr val="accent1"/>
+          </a:fillRef>
+          <a:effectRef idx="0">
+            <a:schemeClr val="accent1"/>
+          </a:effectRef>
+          <a:fontRef idx="minor">
+            <a:schemeClr val="lt1"/>
+          </a:fontRef>
+        </p:style>
+        <p:txBody>
+          <a:bodyPr rtlCol="0" anchor="ctr"/>
+          <a:lstStyle/>
+          <a:p>
+            <a:pPr algn="ctr"/>
+            <a:r>
+              <a:rPr lang="en-US" sz="1000" dirty="0" smtClean="0">
+                <a:solidFill>
+                  <a:schemeClr val="tx1"/>
+                </a:solidFill>
+              </a:rPr>
+              <a:t>UI</a:t>
+            </a:r>
+            <a:endParaRPr lang="en-US" sz="1000" dirty="0">
+              <a:solidFill>
+                <a:schemeClr val="tx1"/>
+              </a:solidFill>
+            </a:endParaRPr>
+          </a:p>
+        </p:txBody>
+      </p:sp>
+      <p:cxnSp>
+        <p:nvCxnSpPr>
+          <p:cNvPr id="58" name="Elbow Connector 57"/>
+          <p:cNvCxnSpPr>
+            <a:stCxn id="36" idx="1"/>
+            <a:endCxn id="40" idx="1"/>
+          </p:cNvCxnSpPr>
+          <p:nvPr/>
+        </p:nvCxnSpPr>
+        <p:spPr>
+          <a:xfrm rot="10800000">
+            <a:off x="3040031" y="3403863"/>
+            <a:ext cx="3091" cy="1096889"/>
+          </a:xfrm>
+          <a:prstGeom prst="bentConnector3">
+            <a:avLst>
+              <a:gd name="adj1" fmla="val 7495665"/>
+            </a:avLst>
+          </a:prstGeom>
+          <a:ln>
+            <a:tailEnd type="triangle"/>
+          </a:ln>
+        </p:spPr>
+        <p:style>
+          <a:lnRef idx="1">
+            <a:schemeClr val="accent1"/>
+          </a:lnRef>
+          <a:fillRef idx="0">
+            <a:schemeClr val="accent1"/>
+          </a:fillRef>
+          <a:effectRef idx="0">
+            <a:schemeClr val="accent1"/>
+          </a:effectRef>
+          <a:fontRef idx="minor">
+            <a:schemeClr val="tx1"/>
+          </a:fontRef>
+        </p:style>
+      </p:cxnSp>
+      <p:cxnSp>
+        <p:nvCxnSpPr>
+          <p:cNvPr id="61" name="Elbow Connector 60"/>
+          <p:cNvCxnSpPr>
+            <a:stCxn id="13" idx="1"/>
+            <a:endCxn id="28" idx="1"/>
+          </p:cNvCxnSpPr>
+          <p:nvPr/>
+        </p:nvCxnSpPr>
+        <p:spPr>
+          <a:xfrm rot="10800000" flipV="1">
+            <a:off x="5574909" y="3404127"/>
+            <a:ext cx="12700" cy="1292662"/>
+          </a:xfrm>
+          <a:prstGeom prst="bentConnector3">
+            <a:avLst>
+              <a:gd name="adj1" fmla="val 1800000"/>
+            </a:avLst>
+          </a:prstGeom>
+          <a:ln>
+            <a:tailEnd type="triangle"/>
+          </a:ln>
+        </p:spPr>
+        <p:style>
+          <a:lnRef idx="1">
+            <a:schemeClr val="accent1"/>
+          </a:lnRef>
+          <a:fillRef idx="0">
+            <a:schemeClr val="accent1"/>
+          </a:fillRef>
+          <a:effectRef idx="0">
+            <a:schemeClr val="accent1"/>
+          </a:effectRef>
+          <a:fontRef idx="minor">
+            <a:schemeClr val="tx1"/>
+          </a:fontRef>
+        </p:style>
+      </p:cxnSp>
+      <p:cxnSp>
+        <p:nvCxnSpPr>
+          <p:cNvPr id="66" name="Elbow Connector 65"/>
+          <p:cNvCxnSpPr>
+            <a:stCxn id="32" idx="3"/>
+            <a:endCxn id="56" idx="3"/>
+          </p:cNvCxnSpPr>
+          <p:nvPr/>
+        </p:nvCxnSpPr>
+        <p:spPr>
+          <a:xfrm flipV="1">
+            <a:off x="9378047" y="3595163"/>
+            <a:ext cx="12700" cy="679720"/>
+          </a:xfrm>
+          <a:prstGeom prst="bentConnector3">
+            <a:avLst>
+              <a:gd name="adj1" fmla="val 1800000"/>
+            </a:avLst>
+          </a:prstGeom>
+          <a:ln>
+            <a:headEnd type="triangle" w="med" len="med"/>
+            <a:tailEnd type="triangle" w="med" len="med"/>
+          </a:ln>
+        </p:spPr>
+        <p:style>
+          <a:lnRef idx="1">
+            <a:schemeClr val="accent1"/>
+          </a:lnRef>
+          <a:fillRef idx="0">
+            <a:schemeClr val="accent1"/>
+          </a:fillRef>
+          <a:effectRef idx="0">
+            <a:schemeClr val="accent1"/>
+          </a:effectRef>
+          <a:fontRef idx="minor">
+            <a:schemeClr val="tx1"/>
+          </a:fontRef>
+        </p:style>
+      </p:cxnSp>
+      <p:cxnSp>
+        <p:nvCxnSpPr>
+          <p:cNvPr id="67" name="Elbow Connector 66"/>
+          <p:cNvCxnSpPr>
+            <a:stCxn id="21" idx="3"/>
+            <a:endCxn id="56" idx="3"/>
+          </p:cNvCxnSpPr>
+          <p:nvPr/>
+        </p:nvCxnSpPr>
+        <p:spPr>
+          <a:xfrm flipV="1">
+            <a:off x="9378047" y="3595163"/>
+            <a:ext cx="12700" cy="1101625"/>
+          </a:xfrm>
+          <a:prstGeom prst="bentConnector3">
+            <a:avLst>
+              <a:gd name="adj1" fmla="val 1800000"/>
+            </a:avLst>
+          </a:prstGeom>
+          <a:ln>
+            <a:tailEnd type="triangle"/>
+          </a:ln>
+        </p:spPr>
+        <p:style>
+          <a:lnRef idx="1">
+            <a:schemeClr val="accent1"/>
+          </a:lnRef>
+          <a:fillRef idx="0">
+            <a:schemeClr val="accent1"/>
+          </a:fillRef>
+          <a:effectRef idx="0">
+            <a:schemeClr val="accent1"/>
+          </a:effectRef>
+          <a:fontRef idx="minor">
+            <a:schemeClr val="tx1"/>
+          </a:fontRef>
+        </p:style>
+      </p:cxnSp>
+    </p:spTree>
+    <p:extLst>
+      <p:ext uri="{BB962C8B-B14F-4D97-AF65-F5344CB8AC3E}">
+        <p14:creationId xmlns:p14="http://schemas.microsoft.com/office/powerpoint/2010/main" val="3866390509"/>
       </p:ext>
     </p:extLst>
   </p:cSld>

</xml_diff>